<commit_message>
Added presentation and code repo qrCode links
</commit_message>
<xml_diff>
--- a/00.presentation/assets/Présentation1.pptx
+++ b/00.presentation/assets/Présentation1.pptx
@@ -281,7 +281,7 @@
       <p15:sldGuideLst xmlns:p15="http://schemas.microsoft.com/office/powerpoint/2012/main"/>
     </p:ext>
     <p:ext uri="GoogleSlidesCustomDataVersion2">
-      <go:slidesCustomData xmlns="" xmlns:mc="http://schemas.openxmlformats.org/markup-compatibility/2006" xmlns:mv="urn:schemas-microsoft-com:mac:vml" xmlns:c="http://schemas.openxmlformats.org/drawingml/2006/chart" xmlns:dgm="http://schemas.openxmlformats.org/drawingml/2006/diagram" xmlns:o="urn:schemas-microsoft-com:office:office" xmlns:v="urn:schemas-microsoft-com:vml" xmlns:pvml="urn:schemas-microsoft-com:office:powerpoint" xmlns:com="http://schemas.openxmlformats.org/drawingml/2006/compatibility" xmlns:p14="http://schemas.microsoft.com/office/powerpoint/2010/main" xmlns:p15="http://schemas.microsoft.com/office/powerpoint/2012/main" xmlns:ahyp="http://schemas.microsoft.com/office/drawing/2018/hyperlinkcolor" xmlns:go="http://customooxmlschemas.google.com/" r:id="rId39" roundtripDataSignature="AMtx7miJ6yfh3jtQDMVgc8tKc1qJJiJs7w=="/>
+      <go:slidesCustomData xmlns:go="http://customooxmlschemas.google.com/" xmlns:ahyp="http://schemas.microsoft.com/office/drawing/2018/hyperlinkcolor" xmlns:p15="http://schemas.microsoft.com/office/powerpoint/2012/main" xmlns:p14="http://schemas.microsoft.com/office/powerpoint/2010/main" xmlns:com="http://schemas.openxmlformats.org/drawingml/2006/compatibility" xmlns:pvml="urn:schemas-microsoft-com:office:powerpoint" xmlns:v="urn:schemas-microsoft-com:vml" xmlns:o="urn:schemas-microsoft-com:office:office" xmlns:dgm="http://schemas.openxmlformats.org/drawingml/2006/diagram" xmlns:c="http://schemas.openxmlformats.org/drawingml/2006/chart" xmlns:mv="urn:schemas-microsoft-com:mac:vml" xmlns:mc="http://schemas.openxmlformats.org/markup-compatibility/2006" xmlns="" r:id="rId39" roundtripDataSignature="AMtx7miJ6yfh3jtQDMVgc8tKc1qJJiJs7w=="/>
     </p:ext>
   </p:extLst>
 </p:presentation>
@@ -3623,7 +3623,7 @@
         <p:fade/>
       </p:transition>
     </mc:Choice>
-    <mc:Fallback xmlns="" xmlns:mv="urn:schemas-microsoft-com:mac:vml" xmlns:c="http://schemas.openxmlformats.org/drawingml/2006/chart" xmlns:dgm="http://schemas.openxmlformats.org/drawingml/2006/diagram" xmlns:o="urn:schemas-microsoft-com:office:office" xmlns:v="urn:schemas-microsoft-com:vml" xmlns:pvml="urn:schemas-microsoft-com:office:powerpoint" xmlns:com="http://schemas.openxmlformats.org/drawingml/2006/compatibility" xmlns:p15="http://schemas.microsoft.com/office/powerpoint/2012/main" xmlns:ahyp="http://schemas.microsoft.com/office/drawing/2018/hyperlinkcolor">
+    <mc:Fallback xmlns:ahyp="http://schemas.microsoft.com/office/drawing/2018/hyperlinkcolor" xmlns:p15="http://schemas.microsoft.com/office/powerpoint/2012/main" xmlns:com="http://schemas.openxmlformats.org/drawingml/2006/compatibility" xmlns:pvml="urn:schemas-microsoft-com:office:powerpoint" xmlns:v="urn:schemas-microsoft-com:vml" xmlns:o="urn:schemas-microsoft-com:office:office" xmlns:dgm="http://schemas.openxmlformats.org/drawingml/2006/diagram" xmlns:c="http://schemas.openxmlformats.org/drawingml/2006/chart" xmlns:mv="urn:schemas-microsoft-com:mac:vml" xmlns="">
       <p:transition spd="slow">
         <p:fade/>
       </p:transition>
@@ -7391,7 +7391,7 @@
           <a:p>
             <a:fld id="{1D8BD707-D9CF-40AE-B4C6-C98DA3205C09}" type="datetimeFigureOut">
               <a:rPr lang="en-US"/>
-              <a:t>3/26/24</a:t>
+              <a:t>3/27/24</a:t>
             </a:fld>
             <a:endParaRPr lang="en-US"/>
           </a:p>
@@ -13338,6 +13338,36 @@
           </a:p>
         </p:txBody>
       </p:sp>
+      <p:pic>
+        <p:nvPicPr>
+          <p:cNvPr id="5" name="Image 4">
+            <a:extLst>
+              <a:ext uri="{FF2B5EF4-FFF2-40B4-BE49-F238E27FC236}">
+                <a16:creationId xmlns:a16="http://schemas.microsoft.com/office/drawing/2014/main" id="{AF87456B-54F2-AC0E-96E6-EA284A51E7E8}"/>
+              </a:ext>
+            </a:extLst>
+          </p:cNvPr>
+          <p:cNvPicPr>
+            <a:picLocks noChangeAspect="1"/>
+          </p:cNvPicPr>
+          <p:nvPr/>
+        </p:nvPicPr>
+        <p:blipFill>
+          <a:blip r:embed="rId2"/>
+          <a:stretch>
+            <a:fillRect/>
+          </a:stretch>
+        </p:blipFill>
+        <p:spPr>
+          <a:xfrm>
+            <a:off x="4339938" y="1889633"/>
+            <a:ext cx="3512124" cy="3512124"/>
+          </a:xfrm>
+          <a:prstGeom prst="rect">
+            <a:avLst/>
+          </a:prstGeom>
+        </p:spPr>
+      </p:pic>
     </p:spTree>
     <p:extLst>
       <p:ext uri="{BB962C8B-B14F-4D97-AF65-F5344CB8AC3E}">

</xml_diff>